<commit_message>
Poprawki w lekcji 7 nadeslane przez Rafala
</commit_message>
<xml_diff>
--- a/lesson-7/Student materials - 7 - Test automation with Jmeter.pptx
+++ b/lesson-7/Student materials - 7 - Test automation with Jmeter.pptx
@@ -254,7 +254,7 @@
             <a:fld id="{C4843D26-F355-3844-A4EF-19D4FD875597}" type="datetimeFigureOut">
               <a:rPr lang="de-DE" smtClean="0"/>
               <a:pPr/>
-              <a:t>18.11.2015</a:t>
+              <a:t>20.11.2015</a:t>
             </a:fld>
             <a:endParaRPr lang="de-DE" dirty="0"/>
           </a:p>
@@ -422,7 +422,7 @@
             <a:fld id="{8E2CFE12-C1FB-D740-8B6C-AFB72D5D4002}" type="datetimeFigureOut">
               <a:rPr lang="de-DE" smtClean="0"/>
               <a:pPr/>
-              <a:t>18.11.2015</a:t>
+              <a:t>20.11.2015</a:t>
             </a:fld>
             <a:endParaRPr lang="de-DE" dirty="0"/>
           </a:p>
@@ -3697,7 +3697,7 @@
           <a:graphicData uri="http://schemas.openxmlformats.org/presentationml/2006/ole">
             <mc:AlternateContent xmlns:mc="http://schemas.openxmlformats.org/markup-compatibility/2006">
               <mc:Choice xmlns:v="urn:schemas-microsoft-com:vml" Requires="v">
-                <p:oleObj spid="_x0000_s2104" name="think-cell Folie" r:id="rId4" imgW="305" imgH="303" progId="TCLayout.ActiveDocument.1">
+                <p:oleObj spid="_x0000_s2107" name="think-cell Folie" r:id="rId4" imgW="305" imgH="303" progId="TCLayout.ActiveDocument.1">
                   <p:embed/>
                 </p:oleObj>
               </mc:Choice>
@@ -4094,7 +4094,7 @@
           <a:graphicData uri="http://schemas.openxmlformats.org/presentationml/2006/ole">
             <mc:AlternateContent xmlns:mc="http://schemas.openxmlformats.org/markup-compatibility/2006">
               <mc:Choice xmlns:v="urn:schemas-microsoft-com:vml" Requires="v">
-                <p:oleObj spid="_x0000_s1084" name="think-cell Folie" r:id="rId13" imgW="305" imgH="303" progId="TCLayout.ActiveDocument.1">
+                <p:oleObj spid="_x0000_s1087" name="think-cell Folie" r:id="rId13" imgW="305" imgH="303" progId="TCLayout.ActiveDocument.1">
                   <p:embed/>
                 </p:oleObj>
               </mc:Choice>
@@ -8893,7 +8893,7 @@
         <p:spPr>
           <a:xfrm>
             <a:off x="5170140" y="4016431"/>
-            <a:ext cx="3502907" cy="415498"/>
+            <a:ext cx="3502907" cy="738664"/>
           </a:xfrm>
           <a:prstGeom prst="rect">
             <a:avLst/>
@@ -8920,9 +8920,31 @@
           <a:lstStyle/>
           <a:p>
             <a:r>
-              <a:rPr lang="pl-PL" sz="1050" dirty="0"/>
-              <a:t>http://localhost:8080/registrationpanel/#RegistrationsPlace:Registrations</a:t>
-            </a:r>
+              <a:rPr lang="pl-PL" sz="1050" dirty="0">
+                <a:hlinkClick r:id="rId3"/>
+              </a:rPr>
+              <a:t>http://localhost:8080/registrationpanel/#</a:t>
+            </a:r>
+            <a:r>
+              <a:rPr lang="pl-PL" sz="1050" dirty="0" smtClean="0">
+                <a:hlinkClick r:id="rId3"/>
+              </a:rPr>
+              <a:t>RegistrationsPlace:Registrations</a:t>
+            </a:r>
+            <a:endParaRPr lang="pl-PL" sz="1050" dirty="0" smtClean="0"/>
+          </a:p>
+          <a:p>
+            <a:r>
+              <a:rPr lang="pl-PL" sz="1050" dirty="0" smtClean="0"/>
+              <a:t>Login: admin</a:t>
+            </a:r>
+          </a:p>
+          <a:p>
+            <a:r>
+              <a:rPr lang="pl-PL" sz="1050" dirty="0" smtClean="0"/>
+              <a:t>Passw: </a:t>
+            </a:r>
+            <a:endParaRPr lang="pl-PL" sz="1050" dirty="0"/>
           </a:p>
         </p:txBody>
       </p:sp>
@@ -9532,13 +9554,29 @@
         <p:spPr>
           <a:xfrm>
             <a:off x="976312" y="2867532"/>
-            <a:ext cx="7724458" cy="169277"/>
+            <a:ext cx="7724458" cy="507831"/>
           </a:xfrm>
         </p:spPr>
         <p:txBody>
           <a:bodyPr/>
           <a:lstStyle/>
           <a:p>
+            <a:r>
+              <a:rPr lang="pl-PL" dirty="0" smtClean="0"/>
+              <a:t>Rafał Nikiel</a:t>
+            </a:r>
+          </a:p>
+          <a:p>
+            <a:r>
+              <a:rPr lang="pl-PL" dirty="0" smtClean="0"/>
+              <a:t>GFT</a:t>
+            </a:r>
+          </a:p>
+          <a:p>
+            <a:r>
+              <a:rPr lang="pl-PL" dirty="0" smtClean="0"/>
+              <a:t>Rafal.Nikiel@gft.com</a:t>
+            </a:r>
             <a:endParaRPr lang="de-DE" dirty="0"/>
           </a:p>
         </p:txBody>
@@ -9634,31 +9672,15 @@
             <a:pPr marL="360000"/>
             <a:r>
               <a:rPr lang="pl-PL" dirty="0" smtClean="0"/>
-              <a:t>What </a:t>
-            </a:r>
+              <a:t>What is Jmeter ? </a:t>
+            </a:r>
+            <a:endParaRPr lang="en-GB" dirty="0" smtClean="0"/>
+          </a:p>
+          <a:p>
+            <a:pPr marL="360000"/>
             <a:r>
               <a:rPr lang="pl-PL" dirty="0" smtClean="0"/>
-              <a:t>is Jmeter </a:t>
-            </a:r>
-            <a:r>
-              <a:rPr lang="pl-PL" dirty="0" smtClean="0"/>
-              <a:t>? </a:t>
-            </a:r>
-            <a:endParaRPr lang="en-GB" dirty="0" smtClean="0"/>
-          </a:p>
-          <a:p>
-            <a:pPr marL="360000"/>
-            <a:r>
-              <a:rPr lang="pl-PL" dirty="0" smtClean="0"/>
-              <a:t>What </a:t>
-            </a:r>
-            <a:r>
-              <a:rPr lang="pl-PL" dirty="0" smtClean="0"/>
-              <a:t>we can </a:t>
-            </a:r>
-            <a:r>
-              <a:rPr lang="pl-PL" dirty="0" smtClean="0"/>
-              <a:t>do with Jmeter?</a:t>
+              <a:t>What we can do with Jmeter?</a:t>
             </a:r>
             <a:endParaRPr lang="en-GB" dirty="0" smtClean="0"/>
           </a:p>
@@ -9668,7 +9690,6 @@
               <a:rPr lang="pl-PL" dirty="0" smtClean="0"/>
               <a:t>Excercises</a:t>
             </a:r>
-            <a:endParaRPr lang="pl-PL" dirty="0" smtClean="0"/>
           </a:p>
           <a:p>
             <a:pPr marL="360000"/>
@@ -9797,11 +9818,7 @@
             <a:pPr lvl="1"/>
             <a:r>
               <a:rPr lang="pl-PL" altLang="de-DE" dirty="0" smtClean="0"/>
-              <a:t>Why? </a:t>
-            </a:r>
-            <a:r>
-              <a:rPr lang="pl-PL" altLang="de-DE" dirty="0" smtClean="0"/>
-              <a:t>Any examples ?</a:t>
+              <a:t>Why? Any examples ?</a:t>
             </a:r>
           </a:p>
           <a:p>
@@ -11238,11 +11255,7 @@
           <a:p>
             <a:r>
               <a:rPr lang="en-US" noProof="0" dirty="0" smtClean="0"/>
-              <a:t>Testing </a:t>
-            </a:r>
-            <a:r>
-              <a:rPr lang="en-US" noProof="0" dirty="0" smtClean="0"/>
-              <a:t>pyramid</a:t>
+              <a:t>Testing pyramid</a:t>
             </a:r>
             <a:r>
               <a:rPr lang="pl-PL" noProof="0" dirty="0" smtClean="0"/>
@@ -11697,11 +11710,7 @@
             </a:r>
             <a:r>
               <a:rPr lang="en-US" sz="1400" dirty="0"/>
-              <a:t>Galileo </a:t>
-            </a:r>
-            <a:r>
-              <a:rPr lang="en-US" sz="1400" dirty="0"/>
-              <a:t>Galilei</a:t>
+              <a:t>Galileo Galilei</a:t>
             </a:r>
             <a:endParaRPr lang="pl-PL" sz="1400" dirty="0"/>
           </a:p>
@@ -12536,7 +12545,6 @@
               <a:rPr lang="pl-PL" dirty="0" smtClean="0"/>
               <a:t>Get familiar with the structure and elements that can be added to the Thread Group</a:t>
             </a:r>
-            <a:endParaRPr lang="pl-PL" dirty="0" smtClean="0"/>
           </a:p>
           <a:p>
             <a:pPr marL="407988" lvl="1" indent="-228600">
@@ -13767,6 +13775,15 @@
 </file>
 
 <file path=customXml/item1.xml><?xml version="1.0" encoding="utf-8"?>
+<?mso-contentType ?>
+<FormTemplates xmlns="http://schemas.microsoft.com/sharepoint/v3/contenttype/forms">
+  <Display>DocumentLibraryForm</Display>
+  <Edit>DocumentLibraryForm</Edit>
+  <New>DocumentLibraryForm</New>
+</FormTemplates>
+</file>
+
+<file path=customXml/item2.xml><?xml version="1.0" encoding="utf-8"?>
 <ct:contentTypeSchema xmlns:ct="http://schemas.microsoft.com/office/2006/metadata/contentType" xmlns:ma="http://schemas.microsoft.com/office/2006/metadata/properties/metaAttributes" ct:_="" ma:_="" ma:contentTypeName="Document" ma:contentTypeID="0x010100793B9935CA02AD4F90F0A0FD564FDD82" ma:contentTypeVersion="17" ma:contentTypeDescription="Create a new document." ma:contentTypeScope="" ma:versionID="6168266ad0b2c1ccdc9d2ae0268a5eb6">
   <xsd:schema xmlns:xsd="http://www.w3.org/2001/XMLSchema" xmlns:xs="http://www.w3.org/2001/XMLSchema" xmlns:p="http://schemas.microsoft.com/office/2006/metadata/properties" xmlns:ns2="e44e039f-c551-4112-981c-456f1b630ef1" xmlns:ns3="727178e8-9586-4f49-8e7b-77af9c2fb085" targetNamespace="http://schemas.microsoft.com/office/2006/metadata/properties" ma:root="true" ma:fieldsID="b9b29daf9bb73cd90369de1b0e977594" ns2:_="" ns3:_="">
     <xsd:import namespace="e44e039f-c551-4112-981c-456f1b630ef1"/>
@@ -14263,51 +14280,7 @@
 </ct:contentTypeSchema>
 </file>
 
-<file path=customXml/item2.xml><?xml version="1.0" encoding="utf-8"?>
-<?mso-contentType ?>
-<FormTemplates xmlns="http://schemas.microsoft.com/sharepoint/v3/contenttype/forms">
-  <Display>DocumentLibraryForm</Display>
-  <Edit>DocumentLibraryForm</Edit>
-  <New>DocumentLibraryForm</New>
-</FormTemplates>
-</file>
-
 <file path=customXml/item3.xml><?xml version="1.0" encoding="utf-8"?>
-<p:properties xmlns:p="http://schemas.microsoft.com/office/2006/metadata/properties" xmlns:xsi="http://www.w3.org/2001/XMLSchema-instance" xmlns:pc="http://schemas.microsoft.com/office/infopath/2007/PartnerControls">
-  <documentManagement>
-    <_dlc_DocId xmlns="727178e8-9586-4f49-8e7b-77af9c2fb085">CVD5QAC74SYH-2-13943</_dlc_DocId>
-    <_dlc_DocIdUrl xmlns="727178e8-9586-4f49-8e7b-77af9c2fb085">
-      <Url>https://share.gft.com/sites/Corporate-Marketing/_layouts/DocIdRedir.aspx?ID=CVD5QAC74SYH-2-13943</Url>
-      <Description>CVD5QAC74SYH-2-13943</Description>
-    </_dlc_DocIdUrl>
-    <Functional_x0020_Area xmlns="e44e039f-c551-4112-981c-456f1b630ef1">Functional Area 1</Functional_x0020_Area>
-    <Reference_x0020_Title xmlns="e44e039f-c551-4112-981c-456f1b630ef1" xsi:nil="true"/>
-    <Area xmlns="e44e039f-c551-4112-981c-456f1b630ef1">Area 1</Area>
-    <Project_x0020_size_x0020__x0028_resources_x0029_ xmlns="e44e039f-c551-4112-981c-456f1b630ef1" xsi:nil="true"/>
-    <Comments xmlns="e44e039f-c551-4112-981c-456f1b630ef1" xsi:nil="true"/>
-    <Business_x0020_Sector xmlns="e44e039f-c551-4112-981c-456f1b630ef1">Banking</Business_x0020_Sector>
-    <Client_x0020_Category xmlns="e44e039f-c551-4112-981c-456f1b630ef1">Central</Client_x0020_Category>
-    <Methods_x0020_and_x0020_standards xmlns="e44e039f-c551-4112-981c-456f1b630ef1" xsi:nil="true"/>
-    <Responsible xmlns="e44e039f-c551-4112-981c-456f1b630ef1" xsi:nil="true"/>
-    <Client_x0020_Name xmlns="e44e039f-c551-4112-981c-456f1b630ef1" xsi:nil="true"/>
-    <Client_x0020_approval xmlns="e44e039f-c551-4112-981c-456f1b630ef1">No</Client_x0020_approval>
-    <Plattform_x0020__x0026__x0020_tools xmlns="e44e039f-c551-4112-981c-456f1b630ef1" xsi:nil="true"/>
-    <Project_x0020_ID xmlns="e44e039f-c551-4112-981c-456f1b630ef1" xsi:nil="true"/>
-    <Description0 xmlns="e44e039f-c551-4112-981c-456f1b630ef1" xsi:nil="true"/>
-    <Author_x0020__x002f__x0020_Contact xmlns="e44e039f-c551-4112-981c-456f1b630ef1">
-      <UserInfo>
-        <DisplayName/>
-        <AccountId xsi:nil="true"/>
-        <AccountType/>
-      </UserInfo>
-    </Author_x0020__x002f__x0020_Contact>
-    <Client_x0020_Country xmlns="e44e039f-c551-4112-981c-456f1b630ef1">Germany</Client_x0020_Country>
-    <Year xmlns="e44e039f-c551-4112-981c-456f1b630ef1" xsi:nil="true"/>
-  </documentManagement>
-</p:properties>
-</file>
-
-<file path=customXml/item4.xml><?xml version="1.0" encoding="utf-8"?>
 <?mso-contentType ?>
 <spe:Receivers xmlns:spe="http://schemas.microsoft.com/sharepoint/events">
   <Receiver>
@@ -14353,7 +14326,50 @@
 </spe:Receivers>
 </file>
 
+<file path=customXml/item4.xml><?xml version="1.0" encoding="utf-8"?>
+<p:properties xmlns:p="http://schemas.microsoft.com/office/2006/metadata/properties" xmlns:xsi="http://www.w3.org/2001/XMLSchema-instance" xmlns:pc="http://schemas.microsoft.com/office/infopath/2007/PartnerControls">
+  <documentManagement>
+    <_dlc_DocId xmlns="727178e8-9586-4f49-8e7b-77af9c2fb085">CVD5QAC74SYH-2-13943</_dlc_DocId>
+    <_dlc_DocIdUrl xmlns="727178e8-9586-4f49-8e7b-77af9c2fb085">
+      <Url>https://share.gft.com/sites/Corporate-Marketing/_layouts/DocIdRedir.aspx?ID=CVD5QAC74SYH-2-13943</Url>
+      <Description>CVD5QAC74SYH-2-13943</Description>
+    </_dlc_DocIdUrl>
+    <Functional_x0020_Area xmlns="e44e039f-c551-4112-981c-456f1b630ef1">Functional Area 1</Functional_x0020_Area>
+    <Reference_x0020_Title xmlns="e44e039f-c551-4112-981c-456f1b630ef1" xsi:nil="true"/>
+    <Area xmlns="e44e039f-c551-4112-981c-456f1b630ef1">Area 1</Area>
+    <Project_x0020_size_x0020__x0028_resources_x0029_ xmlns="e44e039f-c551-4112-981c-456f1b630ef1" xsi:nil="true"/>
+    <Comments xmlns="e44e039f-c551-4112-981c-456f1b630ef1" xsi:nil="true"/>
+    <Business_x0020_Sector xmlns="e44e039f-c551-4112-981c-456f1b630ef1">Banking</Business_x0020_Sector>
+    <Client_x0020_Category xmlns="e44e039f-c551-4112-981c-456f1b630ef1">Central</Client_x0020_Category>
+    <Methods_x0020_and_x0020_standards xmlns="e44e039f-c551-4112-981c-456f1b630ef1" xsi:nil="true"/>
+    <Responsible xmlns="e44e039f-c551-4112-981c-456f1b630ef1" xsi:nil="true"/>
+    <Client_x0020_Name xmlns="e44e039f-c551-4112-981c-456f1b630ef1" xsi:nil="true"/>
+    <Client_x0020_approval xmlns="e44e039f-c551-4112-981c-456f1b630ef1">No</Client_x0020_approval>
+    <Plattform_x0020__x0026__x0020_tools xmlns="e44e039f-c551-4112-981c-456f1b630ef1" xsi:nil="true"/>
+    <Project_x0020_ID xmlns="e44e039f-c551-4112-981c-456f1b630ef1" xsi:nil="true"/>
+    <Description0 xmlns="e44e039f-c551-4112-981c-456f1b630ef1" xsi:nil="true"/>
+    <Author_x0020__x002f__x0020_Contact xmlns="e44e039f-c551-4112-981c-456f1b630ef1">
+      <UserInfo>
+        <DisplayName/>
+        <AccountId xsi:nil="true"/>
+        <AccountType/>
+      </UserInfo>
+    </Author_x0020__x002f__x0020_Contact>
+    <Client_x0020_Country xmlns="e44e039f-c551-4112-981c-456f1b630ef1">Germany</Client_x0020_Country>
+    <Year xmlns="e44e039f-c551-4112-981c-456f1b630ef1" xsi:nil="true"/>
+  </documentManagement>
+</p:properties>
+</file>
+
 <file path=customXml/itemProps1.xml><?xml version="1.0" encoding="utf-8"?>
+<ds:datastoreItem xmlns:ds="http://schemas.openxmlformats.org/officeDocument/2006/customXml" ds:itemID="{9217953E-6BB7-40C6-9A84-608D0A8D65EC}">
+  <ds:schemaRefs>
+    <ds:schemaRef ds:uri="http://schemas.microsoft.com/sharepoint/v3/contenttype/forms"/>
+  </ds:schemaRefs>
+</ds:datastoreItem>
+</file>
+
+<file path=customXml/itemProps2.xml><?xml version="1.0" encoding="utf-8"?>
 <ds:datastoreItem xmlns:ds="http://schemas.openxmlformats.org/officeDocument/2006/customXml" ds:itemID="{54CA1130-EAC1-4116-82E4-DF5A51FE3AEA}">
   <ds:schemaRefs>
     <ds:schemaRef ds:uri="http://schemas.microsoft.com/office/2006/metadata/contentType"/>
@@ -14372,15 +14388,15 @@
 </ds:datastoreItem>
 </file>
 
-<file path=customXml/itemProps2.xml><?xml version="1.0" encoding="utf-8"?>
-<ds:datastoreItem xmlns:ds="http://schemas.openxmlformats.org/officeDocument/2006/customXml" ds:itemID="{9217953E-6BB7-40C6-9A84-608D0A8D65EC}">
+<file path=customXml/itemProps3.xml><?xml version="1.0" encoding="utf-8"?>
+<ds:datastoreItem xmlns:ds="http://schemas.openxmlformats.org/officeDocument/2006/customXml" ds:itemID="{A6F3EA8F-EBA0-438A-80BD-6A96E2E10054}">
   <ds:schemaRefs>
-    <ds:schemaRef ds:uri="http://schemas.microsoft.com/sharepoint/v3/contenttype/forms"/>
+    <ds:schemaRef ds:uri="http://schemas.microsoft.com/sharepoint/events"/>
   </ds:schemaRefs>
 </ds:datastoreItem>
 </file>
 
-<file path=customXml/itemProps3.xml><?xml version="1.0" encoding="utf-8"?>
+<file path=customXml/itemProps4.xml><?xml version="1.0" encoding="utf-8"?>
 <ds:datastoreItem xmlns:ds="http://schemas.openxmlformats.org/officeDocument/2006/customXml" ds:itemID="{7445AAF4-B73F-4E3A-B9D2-4DDAE0F1BE8A}">
   <ds:schemaRefs>
     <ds:schemaRef ds:uri="http://schemas.microsoft.com/office/infopath/2007/PartnerControls"/>
@@ -14395,12 +14411,4 @@
     <ds:schemaRef ds:uri="http://schemas.microsoft.com/office/2006/metadata/properties"/>
   </ds:schemaRefs>
 </ds:datastoreItem>
-</file>
-
-<file path=customXml/itemProps4.xml><?xml version="1.0" encoding="utf-8"?>
-<ds:datastoreItem xmlns:ds="http://schemas.openxmlformats.org/officeDocument/2006/customXml" ds:itemID="{A6F3EA8F-EBA0-438A-80BD-6A96E2E10054}">
-  <ds:schemaRefs>
-    <ds:schemaRef ds:uri="http://schemas.microsoft.com/sharepoint/events"/>
-  </ds:schemaRefs>
-</ds:datastoreItem>
 </file>
</xml_diff>